<commit_message>
Modify/improve Riak 102 through 202 decks, remove .key decks
</commit_message>
<xml_diff>
--- a/unsorted/ps dev training/source ppt slides/Riak 102 - Basic Anatomy.pptx
+++ b/unsorted/ps dev training/source ppt slides/Riak 102 - Basic Anatomy.pptx
@@ -1222,6 +1222,13 @@
         </dgm:presLayoutVars>
       </dgm:prSet>
       <dgm:spPr/>
+      <dgm:t>
+        <a:bodyPr/>
+        <a:lstStyle/>
+        <a:p>
+          <a:endParaRPr lang="en-US"/>
+        </a:p>
+      </dgm:t>
     </dgm:pt>
     <dgm:pt modelId="{5CD1D09F-435F-9443-883B-79490EDEF692}" type="pres">
       <dgm:prSet presAssocID="{1C2B8167-4001-B345-B933-3379C7ACBE02}" presName="centerShape" presStyleLbl="node0" presStyleIdx="0" presStyleCnt="1" custScaleX="349036" custScaleY="46204" custLinFactNeighborX="-1915" custLinFactNeighborY="479"/>
@@ -1241,6 +1248,13 @@
     <dgm:pt modelId="{4B633C9E-DB52-3447-9064-734EAEA9F51C}" type="pres">
       <dgm:prSet presAssocID="{B3513B41-61E2-5341-B34A-C7C6262F6D5A}" presName="parTrans" presStyleLbl="bgSibTrans2D1" presStyleIdx="0" presStyleCnt="3" custAng="765439" custScaleX="71577" custScaleY="62863" custLinFactNeighborX="-18807" custLinFactNeighborY="17635"/>
       <dgm:spPr/>
+      <dgm:t>
+        <a:bodyPr/>
+        <a:lstStyle/>
+        <a:p>
+          <a:endParaRPr lang="en-US"/>
+        </a:p>
+      </dgm:t>
     </dgm:pt>
     <dgm:pt modelId="{6EBD4936-ACDB-A24A-B904-72505A60D8D9}" type="pres">
       <dgm:prSet presAssocID="{4F99A376-141D-8E4B-B5DE-E8CD3E67CAC6}" presName="node" presStyleLbl="node1" presStyleIdx="0" presStyleCnt="3" custScaleX="104610" custScaleY="36324" custRadScaleRad="134248" custRadScaleInc="8900">
@@ -1249,10 +1263,24 @@
         </dgm:presLayoutVars>
       </dgm:prSet>
       <dgm:spPr/>
+      <dgm:t>
+        <a:bodyPr/>
+        <a:lstStyle/>
+        <a:p>
+          <a:endParaRPr lang="en-US"/>
+        </a:p>
+      </dgm:t>
     </dgm:pt>
     <dgm:pt modelId="{8CE2911D-0055-2D45-BB86-3142681B3A7A}" type="pres">
       <dgm:prSet presAssocID="{C1A7E932-589A-1643-8613-C17C08635B23}" presName="parTrans" presStyleLbl="bgSibTrans2D1" presStyleIdx="1" presStyleCnt="3" custAng="20797292" custScaleX="102238" custScaleY="53084" custLinFactNeighborX="15370" custLinFactNeighborY="35272"/>
       <dgm:spPr/>
+      <dgm:t>
+        <a:bodyPr/>
+        <a:lstStyle/>
+        <a:p>
+          <a:endParaRPr lang="en-US"/>
+        </a:p>
+      </dgm:t>
     </dgm:pt>
     <dgm:pt modelId="{AD1B142C-2267-F646-AE0E-B936354C0949}" type="pres">
       <dgm:prSet presAssocID="{F3196355-01BD-E944-AE8E-782AE6D149EE}" presName="node" presStyleLbl="node1" presStyleIdx="1" presStyleCnt="3" custScaleY="35824" custRadScaleRad="103886" custRadScaleInc="-9698">
@@ -1261,10 +1289,24 @@
         </dgm:presLayoutVars>
       </dgm:prSet>
       <dgm:spPr/>
+      <dgm:t>
+        <a:bodyPr/>
+        <a:lstStyle/>
+        <a:p>
+          <a:endParaRPr lang="en-US"/>
+        </a:p>
+      </dgm:t>
     </dgm:pt>
     <dgm:pt modelId="{F22309F2-D633-6241-A5BC-EE0E027DDA56}" type="pres">
       <dgm:prSet presAssocID="{AAFB98DB-5430-6B48-9829-6D2550C24014}" presName="parTrans" presStyleLbl="bgSibTrans2D1" presStyleIdx="2" presStyleCnt="3" custAng="18647293" custScaleX="66294" custScaleY="54825" custLinFactNeighborX="31850" custLinFactNeighborY="39568"/>
       <dgm:spPr/>
+      <dgm:t>
+        <a:bodyPr/>
+        <a:lstStyle/>
+        <a:p>
+          <a:endParaRPr lang="en-US"/>
+        </a:p>
+      </dgm:t>
     </dgm:pt>
     <dgm:pt modelId="{41FD9AE0-191E-A047-A31C-820623AA9DC6}" type="pres">
       <dgm:prSet presAssocID="{BCCC5BA4-1E8C-D340-A685-090B85ED2CE8}" presName="node" presStyleLbl="node1" presStyleIdx="2" presStyleCnt="3" custScaleX="115286" custScaleY="36459" custRadScaleRad="129893" custRadScaleInc="-18044">
@@ -1273,21 +1315,28 @@
         </dgm:presLayoutVars>
       </dgm:prSet>
       <dgm:spPr/>
+      <dgm:t>
+        <a:bodyPr/>
+        <a:lstStyle/>
+        <a:p>
+          <a:endParaRPr lang="en-US"/>
+        </a:p>
+      </dgm:t>
     </dgm:pt>
   </dgm:ptLst>
   <dgm:cxnLst>
     <dgm:cxn modelId="{499A1E4B-0F63-8E48-9DCC-3A4916D7ADA8}" srcId="{1C2B8167-4001-B345-B933-3379C7ACBE02}" destId="{4F99A376-141D-8E4B-B5DE-E8CD3E67CAC6}" srcOrd="0" destOrd="0" parTransId="{B3513B41-61E2-5341-B34A-C7C6262F6D5A}" sibTransId="{AC7BC877-B1CE-1C4C-933F-9689FD4BD469}"/>
+    <dgm:cxn modelId="{367A49B9-4EE8-304A-9E39-9D904978C6DD}" type="presOf" srcId="{1C2B8167-4001-B345-B933-3379C7ACBE02}" destId="{5CD1D09F-435F-9443-883B-79490EDEF692}" srcOrd="0" destOrd="0" presId="urn:microsoft.com/office/officeart/2005/8/layout/radial4"/>
+    <dgm:cxn modelId="{B922792F-6389-8341-9157-21F6789D8730}" type="presOf" srcId="{B3513B41-61E2-5341-B34A-C7C6262F6D5A}" destId="{4B633C9E-DB52-3447-9064-734EAEA9F51C}" srcOrd="0" destOrd="0" presId="urn:microsoft.com/office/officeart/2005/8/layout/radial4"/>
+    <dgm:cxn modelId="{7ECCCE8D-7A54-D447-9151-B59CAFAEE294}" srcId="{9D058D7F-B105-6246-8365-A444C51D2CD5}" destId="{1C2B8167-4001-B345-B933-3379C7ACBE02}" srcOrd="0" destOrd="0" parTransId="{296BB7BB-DD82-3C42-8573-9A498853D5B9}" sibTransId="{E3913C24-C03F-A347-A361-040395327F1F}"/>
+    <dgm:cxn modelId="{945F4508-E35D-DE4F-8A3B-80B87F8DB55A}" type="presOf" srcId="{C1A7E932-589A-1643-8613-C17C08635B23}" destId="{8CE2911D-0055-2D45-BB86-3142681B3A7A}" srcOrd="0" destOrd="0" presId="urn:microsoft.com/office/officeart/2005/8/layout/radial4"/>
+    <dgm:cxn modelId="{46BAD553-C2E6-BB43-ABFE-36548A16F06D}" srcId="{1C2B8167-4001-B345-B933-3379C7ACBE02}" destId="{F3196355-01BD-E944-AE8E-782AE6D149EE}" srcOrd="1" destOrd="0" parTransId="{C1A7E932-589A-1643-8613-C17C08635B23}" sibTransId="{F9B61433-7C9F-D34F-9607-C1D58605D3B5}"/>
+    <dgm:cxn modelId="{7F6E4E69-9CA2-BA41-BEE1-BB27422A3DA3}" type="presOf" srcId="{BCCC5BA4-1E8C-D340-A685-090B85ED2CE8}" destId="{41FD9AE0-191E-A047-A31C-820623AA9DC6}" srcOrd="0" destOrd="0" presId="urn:microsoft.com/office/officeart/2005/8/layout/radial4"/>
     <dgm:cxn modelId="{EE765F32-7C5B-714A-B046-E6BC933A4DC6}" type="presOf" srcId="{F3196355-01BD-E944-AE8E-782AE6D149EE}" destId="{AD1B142C-2267-F646-AE0E-B936354C0949}" srcOrd="0" destOrd="0" presId="urn:microsoft.com/office/officeart/2005/8/layout/radial4"/>
-    <dgm:cxn modelId="{945F4508-E35D-DE4F-8A3B-80B87F8DB55A}" type="presOf" srcId="{C1A7E932-589A-1643-8613-C17C08635B23}" destId="{8CE2911D-0055-2D45-BB86-3142681B3A7A}" srcOrd="0" destOrd="0" presId="urn:microsoft.com/office/officeart/2005/8/layout/radial4"/>
-    <dgm:cxn modelId="{B922792F-6389-8341-9157-21F6789D8730}" type="presOf" srcId="{B3513B41-61E2-5341-B34A-C7C6262F6D5A}" destId="{4B633C9E-DB52-3447-9064-734EAEA9F51C}" srcOrd="0" destOrd="0" presId="urn:microsoft.com/office/officeart/2005/8/layout/radial4"/>
     <dgm:cxn modelId="{35653007-29B0-CB4C-8D47-5154C69591DC}" type="presOf" srcId="{AAFB98DB-5430-6B48-9829-6D2550C24014}" destId="{F22309F2-D633-6241-A5BC-EE0E027DDA56}" srcOrd="0" destOrd="0" presId="urn:microsoft.com/office/officeart/2005/8/layout/radial4"/>
-    <dgm:cxn modelId="{46BAD553-C2E6-BB43-ABFE-36548A16F06D}" srcId="{1C2B8167-4001-B345-B933-3379C7ACBE02}" destId="{F3196355-01BD-E944-AE8E-782AE6D149EE}" srcOrd="1" destOrd="0" parTransId="{C1A7E932-589A-1643-8613-C17C08635B23}" sibTransId="{F9B61433-7C9F-D34F-9607-C1D58605D3B5}"/>
+    <dgm:cxn modelId="{5507E48F-7A6A-864E-B82E-202E84DE6800}" type="presOf" srcId="{9D058D7F-B105-6246-8365-A444C51D2CD5}" destId="{B4C3CDFB-00C4-0746-93C6-17F31FCEE876}" srcOrd="0" destOrd="0" presId="urn:microsoft.com/office/officeart/2005/8/layout/radial4"/>
+    <dgm:cxn modelId="{C4DA4D66-2F24-C249-A0BB-6F2E239FBF94}" type="presOf" srcId="{4F99A376-141D-8E4B-B5DE-E8CD3E67CAC6}" destId="{6EBD4936-ACDB-A24A-B904-72505A60D8D9}" srcOrd="0" destOrd="0" presId="urn:microsoft.com/office/officeart/2005/8/layout/radial4"/>
     <dgm:cxn modelId="{7828C9C8-B5A7-7749-B4F2-AA4BAEB4765A}" srcId="{1C2B8167-4001-B345-B933-3379C7ACBE02}" destId="{BCCC5BA4-1E8C-D340-A685-090B85ED2CE8}" srcOrd="2" destOrd="0" parTransId="{AAFB98DB-5430-6B48-9829-6D2550C24014}" sibTransId="{3DC1B7B3-F686-294F-B804-B31E4619FDCC}"/>
-    <dgm:cxn modelId="{5507E48F-7A6A-864E-B82E-202E84DE6800}" type="presOf" srcId="{9D058D7F-B105-6246-8365-A444C51D2CD5}" destId="{B4C3CDFB-00C4-0746-93C6-17F31FCEE876}" srcOrd="0" destOrd="0" presId="urn:microsoft.com/office/officeart/2005/8/layout/radial4"/>
-    <dgm:cxn modelId="{367A49B9-4EE8-304A-9E39-9D904978C6DD}" type="presOf" srcId="{1C2B8167-4001-B345-B933-3379C7ACBE02}" destId="{5CD1D09F-435F-9443-883B-79490EDEF692}" srcOrd="0" destOrd="0" presId="urn:microsoft.com/office/officeart/2005/8/layout/radial4"/>
-    <dgm:cxn modelId="{7ECCCE8D-7A54-D447-9151-B59CAFAEE294}" srcId="{9D058D7F-B105-6246-8365-A444C51D2CD5}" destId="{1C2B8167-4001-B345-B933-3379C7ACBE02}" srcOrd="0" destOrd="0" parTransId="{296BB7BB-DD82-3C42-8573-9A498853D5B9}" sibTransId="{E3913C24-C03F-A347-A361-040395327F1F}"/>
-    <dgm:cxn modelId="{7F6E4E69-9CA2-BA41-BEE1-BB27422A3DA3}" type="presOf" srcId="{BCCC5BA4-1E8C-D340-A685-090B85ED2CE8}" destId="{41FD9AE0-191E-A047-A31C-820623AA9DC6}" srcOrd="0" destOrd="0" presId="urn:microsoft.com/office/officeart/2005/8/layout/radial4"/>
-    <dgm:cxn modelId="{C4DA4D66-2F24-C249-A0BB-6F2E239FBF94}" type="presOf" srcId="{4F99A376-141D-8E4B-B5DE-E8CD3E67CAC6}" destId="{6EBD4936-ACDB-A24A-B904-72505A60D8D9}" srcOrd="0" destOrd="0" presId="urn:microsoft.com/office/officeart/2005/8/layout/radial4"/>
     <dgm:cxn modelId="{70161349-37C8-6141-A547-A8CF6F80E3B9}" type="presParOf" srcId="{B4C3CDFB-00C4-0746-93C6-17F31FCEE876}" destId="{5CD1D09F-435F-9443-883B-79490EDEF692}" srcOrd="0" destOrd="0" presId="urn:microsoft.com/office/officeart/2005/8/layout/radial4"/>
     <dgm:cxn modelId="{170EC9CD-9F60-654F-9196-0A757A098CD2}" type="presParOf" srcId="{B4C3CDFB-00C4-0746-93C6-17F31FCEE876}" destId="{4B633C9E-DB52-3447-9064-734EAEA9F51C}" srcOrd="1" destOrd="0" presId="urn:microsoft.com/office/officeart/2005/8/layout/radial4"/>
     <dgm:cxn modelId="{4F5A46C6-DE4C-5A4D-BFDF-0499737F104A}" type="presParOf" srcId="{B4C3CDFB-00C4-0746-93C6-17F31FCEE876}" destId="{6EBD4936-ACDB-A24A-B904-72505A60D8D9}" srcOrd="2" destOrd="0" presId="urn:microsoft.com/office/officeart/2005/8/layout/radial4"/>
@@ -3260,7 +3309,7 @@
           </a:lstStyle>
           <a:p>
             <a:fld id="{1EC3ADD2-3CA9-734A-A5C0-E415621D38D9}" type="datetimeFigureOut">
-              <a:t>8/23/15</a:t>
+              <a:t>9/30/15</a:t>
             </a:fld>
             <a:endParaRPr lang="en-US"/>
           </a:p>
@@ -5367,7 +5416,7 @@
           <a:lstStyle/>
           <a:p>
             <a:fld id="{4443DEF9-44C4-C548-A6C2-FDF41AEECFA9}" type="datetimeFigureOut">
-              <a:t>8/23/15</a:t>
+              <a:t>9/30/15</a:t>
             </a:fld>
             <a:endParaRPr lang="en-US" dirty="0"/>
           </a:p>
@@ -5724,7 +5773,7 @@
           <a:lstStyle/>
           <a:p>
             <a:fld id="{4443DEF9-44C4-C548-A6C2-FDF41AEECFA9}" type="datetimeFigureOut">
-              <a:t>8/23/15</a:t>
+              <a:t>9/30/15</a:t>
             </a:fld>
             <a:endParaRPr lang="en-US"/>
           </a:p>
@@ -6081,7 +6130,7 @@
           <a:lstStyle/>
           <a:p>
             <a:fld id="{4443DEF9-44C4-C548-A6C2-FDF41AEECFA9}" type="datetimeFigureOut">
-              <a:t>8/23/15</a:t>
+              <a:t>9/30/15</a:t>
             </a:fld>
             <a:endParaRPr lang="en-US"/>
           </a:p>
@@ -6517,7 +6566,7 @@
           <a:lstStyle/>
           <a:p>
             <a:fld id="{4443DEF9-44C4-C548-A6C2-FDF41AEECFA9}" type="datetimeFigureOut">
-              <a:t>8/23/15</a:t>
+              <a:t>9/30/15</a:t>
             </a:fld>
             <a:endParaRPr lang="en-US"/>
           </a:p>
@@ -6617,7 +6666,7 @@
           <a:lstStyle/>
           <a:p>
             <a:fld id="{4443DEF9-44C4-C548-A6C2-FDF41AEECFA9}" type="datetimeFigureOut">
-              <a:t>8/23/15</a:t>
+              <a:t>9/30/15</a:t>
             </a:fld>
             <a:endParaRPr lang="en-US"/>
           </a:p>
@@ -6757,7 +6806,7 @@
           <a:lstStyle/>
           <a:p>
             <a:fld id="{4443DEF9-44C4-C548-A6C2-FDF41AEECFA9}" type="datetimeFigureOut">
-              <a:t>8/23/15</a:t>
+              <a:t>9/30/15</a:t>
             </a:fld>
             <a:endParaRPr lang="en-US"/>
           </a:p>
@@ -7196,7 +7245,7 @@
             <a:fld id="{4443DEF9-44C4-C548-A6C2-FDF41AEECFA9}" type="datetimeFigureOut">
               <a:rPr lang="en-US" smtClean="0"/>
               <a:pPr/>
-              <a:t>8/23/15</a:t>
+              <a:t>9/30/15</a:t>
             </a:fld>
             <a:endParaRPr lang="en-US" dirty="0"/>
           </a:p>
@@ -8204,11 +8253,11 @@
   <p:clrMapOvr>
     <a:masterClrMapping/>
   </p:clrMapOvr>
-  <mc:AlternateContent xmlns:mc="http://schemas.openxmlformats.org/markup-compatibility/2006">
-    <mc:Choice xmlns:p14="http://schemas.microsoft.com/office/powerpoint/2010/main" Requires="p14">
+  <mc:AlternateContent xmlns:mc="http://schemas.openxmlformats.org/markup-compatibility/2006" xmlns:p14="http://schemas.microsoft.com/office/powerpoint/2010/main">
+    <mc:Choice Requires="p14">
       <p:transition spd="slow" p14:dur="2000"/>
     </mc:Choice>
-    <mc:Fallback>
+    <mc:Fallback xmlns="">
       <p:transition xmlns:p14="http://schemas.microsoft.com/office/powerpoint/2010/main" spd="slow"/>
     </mc:Fallback>
   </mc:AlternateContent>
@@ -11502,11 +11551,11 @@
   <p:clrMapOvr>
     <a:masterClrMapping/>
   </p:clrMapOvr>
-  <mc:AlternateContent xmlns:mc="http://schemas.openxmlformats.org/markup-compatibility/2006">
-    <mc:Choice xmlns:p14="http://schemas.microsoft.com/office/powerpoint/2010/main" Requires="p14">
+  <mc:AlternateContent xmlns:mc="http://schemas.openxmlformats.org/markup-compatibility/2006" xmlns:p14="http://schemas.microsoft.com/office/powerpoint/2010/main">
+    <mc:Choice Requires="p14">
       <p:transition spd="slow" p14:dur="2000"/>
     </mc:Choice>
-    <mc:Fallback>
+    <mc:Fallback xmlns="">
       <p:transition xmlns:p14="http://schemas.microsoft.com/office/powerpoint/2010/main" spd="slow"/>
     </mc:Fallback>
   </mc:AlternateContent>

</xml_diff>